<commit_message>
Corrected performance metrics, combined the 2 end cards
</commit_message>
<xml_diff>
--- a/docs/game-of-life-presi.pptx
+++ b/docs/game-of-life-presi.pptx
@@ -5,7 +5,7 @@
     <p:sldMasterId id="2147483719" r:id="rId1"/>
   </p:sldMasterIdLst>
   <p:notesMasterIdLst>
-    <p:notesMasterId r:id="rId23"/>
+    <p:notesMasterId r:id="rId22"/>
   </p:notesMasterIdLst>
   <p:sldIdLst>
     <p:sldId id="276" r:id="rId2"/>
@@ -27,8 +27,7 @@
     <p:sldId id="263" r:id="rId18"/>
     <p:sldId id="281" r:id="rId19"/>
     <p:sldId id="282" r:id="rId20"/>
-    <p:sldId id="283" r:id="rId21"/>
-    <p:sldId id="266" r:id="rId22"/>
+    <p:sldId id="284" r:id="rId21"/>
   </p:sldIdLst>
   <p:sldSz cx="12192000" cy="6858000"/>
   <p:notesSz cx="6858000" cy="9144000"/>
@@ -151,8 +150,7 @@
             <p14:sldId id="263"/>
             <p14:sldId id="281"/>
             <p14:sldId id="282"/>
-            <p14:sldId id="283"/>
-            <p14:sldId id="266"/>
+            <p14:sldId id="284"/>
           </p14:sldIdLst>
         </p14:section>
       </p14:sectionLst>
@@ -19534,10 +19532,10 @@
       </p:sp>
       <p:pic>
         <p:nvPicPr>
-          <p:cNvPr id="3" name="Picture 3">
+          <p:cNvPr id="5" name="Picture 4">
             <a:extLst>
               <a:ext uri="{FF2B5EF4-FFF2-40B4-BE49-F238E27FC236}">
-                <a16:creationId xmlns:a16="http://schemas.microsoft.com/office/drawing/2014/main" id="{95AD0873-505E-4CB1-B6AC-B26EED7B4C4E}"/>
+                <a16:creationId xmlns:a16="http://schemas.microsoft.com/office/drawing/2014/main" id="{AA655998-E3CC-48E2-AE7B-BE2B22B8ED98}"/>
               </a:ext>
             </a:extLst>
           </p:cNvPr>
@@ -19554,16 +19552,12 @@
         </p:blipFill>
         <p:spPr>
           <a:xfrm>
-            <a:off x="90489" y="2902022"/>
-            <a:ext cx="12011028" cy="2314574"/>
+            <a:off x="457200" y="3324696"/>
+            <a:ext cx="11140751" cy="1441335"/>
           </a:xfrm>
           <a:prstGeom prst="rect">
             <a:avLst/>
           </a:prstGeom>
-          <a:noFill/>
-          <a:ln cap="flat">
-            <a:noFill/>
-          </a:ln>
         </p:spPr>
       </p:pic>
     </p:spTree>
@@ -20331,14 +20325,6 @@
 <file path=ppt/slides/slide20.xml><?xml version="1.0" encoding="utf-8"?>
 <p:sld xmlns:a="http://schemas.openxmlformats.org/drawingml/2006/main" xmlns:r="http://schemas.openxmlformats.org/officeDocument/2006/relationships" xmlns:p="http://schemas.openxmlformats.org/presentationml/2006/main">
   <p:cSld>
-    <p:bg>
-      <p:bgPr>
-        <a:solidFill>
-          <a:schemeClr val="bg1"/>
-        </a:solidFill>
-        <a:effectLst/>
-      </p:bgPr>
-    </p:bg>
     <p:spTree>
       <p:nvGrpSpPr>
         <p:cNvPr id="1" name=""/>
@@ -20355,401 +20341,10 @@
       </p:grpSpPr>
       <p:sp>
         <p:nvSpPr>
-          <p:cNvPr id="15" name="Freeform 6">
-            <a:extLst>
-              <a:ext uri="{FF2B5EF4-FFF2-40B4-BE49-F238E27FC236}">
-                <a16:creationId xmlns:a16="http://schemas.microsoft.com/office/drawing/2014/main" id="{133F8CB7-795C-4272-9073-64D8CF97F220}"/>
-              </a:ext>
-              <a:ext uri="{C183D7F6-B498-43B3-948B-1728B52AA6E4}">
-                <adec:decorative xmlns:adec="http://schemas.microsoft.com/office/drawing/2017/decorative" val="1"/>
-              </a:ext>
-            </a:extLst>
-          </p:cNvPr>
-          <p:cNvSpPr>
-            <a:spLocks noGrp="1" noRot="1" noChangeAspect="1" noMove="1" noResize="1" noEditPoints="1" noAdjustHandles="1" noChangeArrowheads="1" noChangeShapeType="1" noTextEdit="1"/>
-          </p:cNvSpPr>
-          <p:nvPr>
-            <p:extLst>
-              <p:ext uri="{386F3935-93C4-4BCD-93E2-E3B085C9AB24}">
-                <p16:designElem xmlns:p16="http://schemas.microsoft.com/office/powerpoint/2015/main" val="1"/>
-              </p:ext>
-            </p:extLst>
-          </p:nvPr>
-        </p:nvSpPr>
-        <p:spPr bwMode="auto">
-          <a:xfrm>
-            <a:off x="0" y="-3175"/>
-            <a:ext cx="12192000" cy="5203825"/>
-          </a:xfrm>
-          <a:custGeom>
-            <a:avLst/>
-            <a:gdLst/>
-            <a:ahLst/>
-            <a:cxnLst/>
-            <a:rect l="0" t="0" r="r" b="b"/>
-            <a:pathLst>
-              <a:path w="5760" h="3278">
-                <a:moveTo>
-                  <a:pt x="5760" y="0"/>
-                </a:moveTo>
-                <a:lnTo>
-                  <a:pt x="0" y="0"/>
-                </a:lnTo>
-                <a:lnTo>
-                  <a:pt x="0" y="3090"/>
-                </a:lnTo>
-                <a:lnTo>
-                  <a:pt x="943" y="3090"/>
-                </a:lnTo>
-                <a:lnTo>
-                  <a:pt x="1123" y="3270"/>
-                </a:lnTo>
-                <a:lnTo>
-                  <a:pt x="1123" y="3270"/>
-                </a:lnTo>
-                <a:lnTo>
-                  <a:pt x="1127" y="3272"/>
-                </a:lnTo>
-                <a:lnTo>
-                  <a:pt x="1133" y="3275"/>
-                </a:lnTo>
-                <a:lnTo>
-                  <a:pt x="1139" y="3278"/>
-                </a:lnTo>
-                <a:lnTo>
-                  <a:pt x="1144" y="3278"/>
-                </a:lnTo>
-                <a:lnTo>
-                  <a:pt x="1150" y="3278"/>
-                </a:lnTo>
-                <a:lnTo>
-                  <a:pt x="1155" y="3275"/>
-                </a:lnTo>
-                <a:lnTo>
-                  <a:pt x="1161" y="3272"/>
-                </a:lnTo>
-                <a:lnTo>
-                  <a:pt x="1165" y="3270"/>
-                </a:lnTo>
-                <a:lnTo>
-                  <a:pt x="1345" y="3090"/>
-                </a:lnTo>
-                <a:lnTo>
-                  <a:pt x="5760" y="3090"/>
-                </a:lnTo>
-                <a:lnTo>
-                  <a:pt x="5760" y="0"/>
-                </a:lnTo>
-                <a:close/>
-              </a:path>
-            </a:pathLst>
-          </a:custGeom>
-          <a:ln/>
-          <a:effectLst/>
-          <a:extLst>
-            <a:ext uri="{91240B29-F687-4f45-9708-019B960494DF}">
-              <a14:hiddenLine xmlns="" xmlns:a16="http://schemas.microsoft.com/office/drawing/2014/main" xmlns:p14="http://schemas.microsoft.com/office/powerpoint/2010/main" xmlns:a14="http://schemas.microsoft.com/office/drawing/2010/main" w="9525">
-                <a:solidFill>
-                  <a:srgbClr val="000000"/>
-                </a:solidFill>
-                <a:round/>
-                <a:headEnd/>
-                <a:tailEnd/>
-              </a14:hiddenLine>
-            </a:ext>
-          </a:extLst>
-        </p:spPr>
-        <p:style>
-          <a:lnRef idx="1">
-            <a:schemeClr val="accent1"/>
-          </a:lnRef>
-          <a:fillRef idx="3">
-            <a:schemeClr val="accent1"/>
-          </a:fillRef>
-          <a:effectRef idx="2">
-            <a:schemeClr val="accent1"/>
-          </a:effectRef>
-          <a:fontRef idx="minor">
-            <a:schemeClr val="lt1"/>
-          </a:fontRef>
-        </p:style>
-      </p:sp>
-      <p:sp>
-        <p:nvSpPr>
-          <p:cNvPr id="16" name="Rectangle 10">
-            <a:extLst>
-              <a:ext uri="{FF2B5EF4-FFF2-40B4-BE49-F238E27FC236}">
-                <a16:creationId xmlns:a16="http://schemas.microsoft.com/office/drawing/2014/main" id="{B7743172-17A8-4FA4-8434-B813E03B7665}"/>
-              </a:ext>
-              <a:ext uri="{C183D7F6-B498-43B3-948B-1728B52AA6E4}">
-                <adec:decorative xmlns:adec="http://schemas.microsoft.com/office/drawing/2017/decorative" val="1"/>
-              </a:ext>
-            </a:extLst>
-          </p:cNvPr>
-          <p:cNvSpPr>
-            <a:spLocks noGrp="1" noRot="1" noChangeAspect="1" noMove="1" noResize="1" noEditPoints="1" noAdjustHandles="1" noChangeArrowheads="1" noChangeShapeType="1" noTextEdit="1"/>
-          </p:cNvSpPr>
-          <p:nvPr>
-            <p:extLst>
-              <p:ext uri="{386F3935-93C4-4BCD-93E2-E3B085C9AB24}">
-                <p16:designElem xmlns:p16="http://schemas.microsoft.com/office/powerpoint/2015/main" val="1"/>
-              </p:ext>
-            </p:extLst>
-          </p:nvPr>
-        </p:nvSpPr>
-        <p:spPr>
-          <a:xfrm>
-            <a:off x="0" y="0"/>
-            <a:ext cx="12192000" cy="6858000"/>
-          </a:xfrm>
-          <a:prstGeom prst="rect">
-            <a:avLst/>
-          </a:prstGeom>
-          <a:solidFill>
-            <a:schemeClr val="bg1"/>
-          </a:solidFill>
-          <a:ln>
-            <a:noFill/>
-          </a:ln>
-        </p:spPr>
-        <p:style>
-          <a:lnRef idx="2">
-            <a:schemeClr val="accent1">
-              <a:shade val="50000"/>
-            </a:schemeClr>
-          </a:lnRef>
-          <a:fillRef idx="1">
-            <a:schemeClr val="accent1"/>
-          </a:fillRef>
-          <a:effectRef idx="0">
-            <a:schemeClr val="accent1"/>
-          </a:effectRef>
-          <a:fontRef idx="minor">
-            <a:schemeClr val="lt1"/>
-          </a:fontRef>
-        </p:style>
-        <p:txBody>
-          <a:bodyPr rtlCol="0" anchor="ctr"/>
-          <a:lstStyle/>
-          <a:p>
-            <a:pPr algn="ctr"/>
-            <a:endParaRPr lang="en-US"/>
-          </a:p>
-        </p:txBody>
-      </p:sp>
-      <p:sp>
-        <p:nvSpPr>
-          <p:cNvPr id="17" name="Freeform 23">
-            <a:extLst>
-              <a:ext uri="{FF2B5EF4-FFF2-40B4-BE49-F238E27FC236}">
-                <a16:creationId xmlns:a16="http://schemas.microsoft.com/office/drawing/2014/main" id="{4CE1233C-FD2F-489E-BFDE-086F5FED6491}"/>
-              </a:ext>
-              <a:ext uri="{C183D7F6-B498-43B3-948B-1728B52AA6E4}">
-                <adec:decorative xmlns:adec="http://schemas.microsoft.com/office/drawing/2017/decorative" val="1"/>
-              </a:ext>
-            </a:extLst>
-          </p:cNvPr>
-          <p:cNvSpPr>
-            <a:spLocks noGrp="1" noRot="1" noChangeAspect="1" noMove="1" noResize="1" noEditPoints="1" noAdjustHandles="1" noChangeArrowheads="1" noChangeShapeType="1" noTextEdit="1"/>
-          </p:cNvSpPr>
-          <p:nvPr>
-            <p:extLst>
-              <p:ext uri="{386F3935-93C4-4BCD-93E2-E3B085C9AB24}">
-                <p16:designElem xmlns:p16="http://schemas.microsoft.com/office/powerpoint/2015/main" val="1"/>
-              </p:ext>
-            </p:extLst>
-          </p:nvPr>
-        </p:nvSpPr>
-        <p:spPr bwMode="white">
-          <a:xfrm>
-            <a:off x="0" y="0"/>
-            <a:ext cx="4637005" cy="6858000"/>
-          </a:xfrm>
-          <a:custGeom>
-            <a:avLst/>
-            <a:gdLst>
-              <a:gd name="connsiteX0" fmla="*/ 0 w 4637005"/>
-              <a:gd name="connsiteY0" fmla="*/ 0 h 6858000"/>
-              <a:gd name="connsiteX1" fmla="*/ 4637005 w 4637005"/>
-              <a:gd name="connsiteY1" fmla="*/ 0 h 6858000"/>
-              <a:gd name="connsiteX2" fmla="*/ 4637005 w 4637005"/>
-              <a:gd name="connsiteY2" fmla="*/ 1900238 h 6858000"/>
-              <a:gd name="connsiteX3" fmla="*/ 4266589 w 4637005"/>
-              <a:gd name="connsiteY3" fmla="*/ 2178050 h 6858000"/>
-              <a:gd name="connsiteX4" fmla="*/ 4262355 w 4637005"/>
-              <a:gd name="connsiteY4" fmla="*/ 2184400 h 6858000"/>
-              <a:gd name="connsiteX5" fmla="*/ 4256005 w 4637005"/>
-              <a:gd name="connsiteY5" fmla="*/ 2193925 h 6858000"/>
-              <a:gd name="connsiteX6" fmla="*/ 4249655 w 4637005"/>
-              <a:gd name="connsiteY6" fmla="*/ 2201863 h 6858000"/>
-              <a:gd name="connsiteX7" fmla="*/ 4249655 w 4637005"/>
-              <a:gd name="connsiteY7" fmla="*/ 2211388 h 6858000"/>
-              <a:gd name="connsiteX8" fmla="*/ 4249655 w 4637005"/>
-              <a:gd name="connsiteY8" fmla="*/ 2220913 h 6858000"/>
-              <a:gd name="connsiteX9" fmla="*/ 4256005 w 4637005"/>
-              <a:gd name="connsiteY9" fmla="*/ 2228850 h 6858000"/>
-              <a:gd name="connsiteX10" fmla="*/ 4262355 w 4637005"/>
-              <a:gd name="connsiteY10" fmla="*/ 2238375 h 6858000"/>
-              <a:gd name="connsiteX11" fmla="*/ 4266589 w 4637005"/>
-              <a:gd name="connsiteY11" fmla="*/ 2244725 h 6858000"/>
-              <a:gd name="connsiteX12" fmla="*/ 4637005 w 4637005"/>
-              <a:gd name="connsiteY12" fmla="*/ 2522538 h 6858000"/>
-              <a:gd name="connsiteX13" fmla="*/ 4637005 w 4637005"/>
-              <a:gd name="connsiteY13" fmla="*/ 6858000 h 6858000"/>
-              <a:gd name="connsiteX14" fmla="*/ 0 w 4637005"/>
-              <a:gd name="connsiteY14" fmla="*/ 6858000 h 6858000"/>
-            </a:gdLst>
-            <a:ahLst/>
-            <a:cxnLst>
-              <a:cxn ang="0">
-                <a:pos x="connsiteX0" y="connsiteY0"/>
-              </a:cxn>
-              <a:cxn ang="0">
-                <a:pos x="connsiteX1" y="connsiteY1"/>
-              </a:cxn>
-              <a:cxn ang="0">
-                <a:pos x="connsiteX2" y="connsiteY2"/>
-              </a:cxn>
-              <a:cxn ang="0">
-                <a:pos x="connsiteX3" y="connsiteY3"/>
-              </a:cxn>
-              <a:cxn ang="0">
-                <a:pos x="connsiteX4" y="connsiteY4"/>
-              </a:cxn>
-              <a:cxn ang="0">
-                <a:pos x="connsiteX5" y="connsiteY5"/>
-              </a:cxn>
-              <a:cxn ang="0">
-                <a:pos x="connsiteX6" y="connsiteY6"/>
-              </a:cxn>
-              <a:cxn ang="0">
-                <a:pos x="connsiteX7" y="connsiteY7"/>
-              </a:cxn>
-              <a:cxn ang="0">
-                <a:pos x="connsiteX8" y="connsiteY8"/>
-              </a:cxn>
-              <a:cxn ang="0">
-                <a:pos x="connsiteX9" y="connsiteY9"/>
-              </a:cxn>
-              <a:cxn ang="0">
-                <a:pos x="connsiteX10" y="connsiteY10"/>
-              </a:cxn>
-              <a:cxn ang="0">
-                <a:pos x="connsiteX11" y="connsiteY11"/>
-              </a:cxn>
-              <a:cxn ang="0">
-                <a:pos x="connsiteX12" y="connsiteY12"/>
-              </a:cxn>
-              <a:cxn ang="0">
-                <a:pos x="connsiteX13" y="connsiteY13"/>
-              </a:cxn>
-              <a:cxn ang="0">
-                <a:pos x="connsiteX14" y="connsiteY14"/>
-              </a:cxn>
-            </a:cxnLst>
-            <a:rect l="l" t="t" r="r" b="b"/>
-            <a:pathLst>
-              <a:path w="4637005" h="6858000">
-                <a:moveTo>
-                  <a:pt x="0" y="0"/>
-                </a:moveTo>
-                <a:lnTo>
-                  <a:pt x="4637005" y="0"/>
-                </a:lnTo>
-                <a:lnTo>
-                  <a:pt x="4637005" y="1900238"/>
-                </a:lnTo>
-                <a:lnTo>
-                  <a:pt x="4266589" y="2178050"/>
-                </a:lnTo>
-                <a:lnTo>
-                  <a:pt x="4262355" y="2184400"/>
-                </a:lnTo>
-                <a:lnTo>
-                  <a:pt x="4256005" y="2193925"/>
-                </a:lnTo>
-                <a:lnTo>
-                  <a:pt x="4249655" y="2201863"/>
-                </a:lnTo>
-                <a:lnTo>
-                  <a:pt x="4249655" y="2211388"/>
-                </a:lnTo>
-                <a:lnTo>
-                  <a:pt x="4249655" y="2220913"/>
-                </a:lnTo>
-                <a:lnTo>
-                  <a:pt x="4256005" y="2228850"/>
-                </a:lnTo>
-                <a:lnTo>
-                  <a:pt x="4262355" y="2238375"/>
-                </a:lnTo>
-                <a:lnTo>
-                  <a:pt x="4266589" y="2244725"/>
-                </a:lnTo>
-                <a:lnTo>
-                  <a:pt x="4637005" y="2522538"/>
-                </a:lnTo>
-                <a:lnTo>
-                  <a:pt x="4637005" y="6858000"/>
-                </a:lnTo>
-                <a:lnTo>
-                  <a:pt x="0" y="6858000"/>
-                </a:lnTo>
-                <a:close/>
-              </a:path>
-            </a:pathLst>
-          </a:custGeom>
-          <a:blipFill>
-            <a:blip r:embed="rId2">
-              <a:duotone>
-                <a:schemeClr val="accent1">
-                  <a:tint val="98000"/>
-                  <a:lumMod val="102000"/>
-                </a:schemeClr>
-                <a:schemeClr val="accent1">
-                  <a:shade val="98000"/>
-                  <a:lumMod val="98000"/>
-                </a:schemeClr>
-              </a:duotone>
-            </a:blip>
-            <a:tile tx="0" ty="0" sx="100000" sy="100000" flip="none" algn="tl"/>
-          </a:blipFill>
-          <a:ln>
-            <a:headEnd/>
-            <a:tailEnd/>
-          </a:ln>
-        </p:spPr>
-        <p:style>
-          <a:lnRef idx="1">
-            <a:schemeClr val="accent1"/>
-          </a:lnRef>
-          <a:fillRef idx="3">
-            <a:schemeClr val="accent1"/>
-          </a:fillRef>
-          <a:effectRef idx="2">
-            <a:schemeClr val="accent1"/>
-          </a:effectRef>
-          <a:fontRef idx="minor">
-            <a:schemeClr val="lt1"/>
-          </a:fontRef>
-        </p:style>
-        <p:txBody>
-          <a:bodyPr wrap="square" rtlCol="0" anchor="ctr">
-            <a:noAutofit/>
-          </a:bodyPr>
-          <a:lstStyle/>
-          <a:p>
-            <a:pPr algn="ctr"/>
-            <a:endParaRPr lang="en-US"/>
-          </a:p>
-        </p:txBody>
-      </p:sp>
-      <p:sp>
-        <p:nvSpPr>
           <p:cNvPr id="2" name="Title 1">
             <a:extLst>
               <a:ext uri="{FF2B5EF4-FFF2-40B4-BE49-F238E27FC236}">
-                <a16:creationId xmlns:a16="http://schemas.microsoft.com/office/drawing/2014/main" id="{A850A630-34B8-4F68-A1B7-0AB653878E08}"/>
+                <a16:creationId xmlns:a16="http://schemas.microsoft.com/office/drawing/2014/main" id="{9B052B8C-C7C6-4368-A193-AEBE30218F79}"/>
               </a:ext>
             </a:extLst>
           </p:cNvPr>
@@ -20760,31 +20355,87 @@
             <p:ph type="title"/>
           </p:nvPr>
         </p:nvSpPr>
-        <p:spPr>
-          <a:xfrm>
-            <a:off x="451514" y="1800225"/>
-            <a:ext cx="3444211" cy="4241136"/>
-          </a:xfrm>
-        </p:spPr>
+        <p:spPr/>
         <p:txBody>
-          <a:bodyPr vert="horz" lIns="91440" tIns="45720" rIns="91440" bIns="45720" rtlCol="0" anchor="t">
-            <a:normAutofit/>
-          </a:bodyPr>
+          <a:bodyPr/>
           <a:lstStyle/>
           <a:p>
             <a:r>
-              <a:rPr lang="en-US" sz="4400" dirty="0"/>
-              <a:t>Thank You! Questions?</a:t>
-            </a:r>
+              <a:rPr lang="en-US" dirty="0"/>
+              <a:t>Questions?</a:t>
+            </a:r>
+            <a:endParaRPr lang="en-DE" dirty="0"/>
+          </a:p>
+        </p:txBody>
+      </p:sp>
+      <p:sp>
+        <p:nvSpPr>
+          <p:cNvPr id="3" name="Text Placeholder 2">
+            <a:extLst>
+              <a:ext uri="{FF2B5EF4-FFF2-40B4-BE49-F238E27FC236}">
+                <a16:creationId xmlns:a16="http://schemas.microsoft.com/office/drawing/2014/main" id="{9A08BFF8-EBA6-4511-A07D-6DB5E340311E}"/>
+              </a:ext>
+            </a:extLst>
+          </p:cNvPr>
+          <p:cNvSpPr>
+            <a:spLocks noGrp="1"/>
+          </p:cNvSpPr>
+          <p:nvPr>
+            <p:ph type="body" sz="quarter" idx="16"/>
+          </p:nvPr>
+        </p:nvSpPr>
+        <p:spPr/>
+        <p:txBody>
+          <a:bodyPr/>
+          <a:lstStyle/>
+          <a:p>
+            <a:r>
+              <a:rPr lang="en-US" dirty="0"/>
+              <a:t>Sources:</a:t>
+            </a:r>
+          </a:p>
+          <a:p>
+            <a:r>
+              <a:rPr lang="en-US" dirty="0"/>
+              <a:t>OpenCL </a:t>
+            </a:r>
+            <a:r>
+              <a:rPr lang="en-US" dirty="0" err="1"/>
+              <a:t>Infografiken</a:t>
+            </a:r>
+            <a:r>
+              <a:rPr lang="en-US" dirty="0"/>
+              <a:t>: </a:t>
+            </a:r>
+            <a:r>
+              <a:rPr lang="en-US" dirty="0">
+                <a:hlinkClick r:id="rId2"/>
+              </a:rPr>
+              <a:t>https://github.com/KhronosGroup/OpenCL-Guide</a:t>
+            </a:r>
+            <a:r>
+              <a:rPr lang="en-US" dirty="0"/>
+              <a:t> (CC-BY 4.0)</a:t>
+            </a:r>
+            <a:endParaRPr lang="en-DE" dirty="0"/>
+          </a:p>
+          <a:p>
+            <a:endParaRPr lang="en-US" dirty="0"/>
+          </a:p>
+          <a:p>
+            <a:endParaRPr lang="en-US" dirty="0"/>
+          </a:p>
+          <a:p>
+            <a:endParaRPr lang="en-DE" dirty="0"/>
           </a:p>
         </p:txBody>
       </p:sp>
       <p:pic>
         <p:nvPicPr>
-          <p:cNvPr id="18" name="Graphic 5" descr="Questions">
+          <p:cNvPr id="4" name="Graphic 5" descr="Questions">
             <a:extLst>
               <a:ext uri="{FF2B5EF4-FFF2-40B4-BE49-F238E27FC236}">
-                <a16:creationId xmlns:a16="http://schemas.microsoft.com/office/drawing/2014/main" id="{AAE9D30B-B7E8-4AFE-A1C9-7D0FCDD677A5}"/>
+                <a16:creationId xmlns:a16="http://schemas.microsoft.com/office/drawing/2014/main" id="{58117C9F-4504-40E4-BE6E-D5B9537E1D6F}"/>
               </a:ext>
             </a:extLst>
           </p:cNvPr>
@@ -20810,8 +20461,8 @@
         </p:blipFill>
         <p:spPr>
           <a:xfrm>
-            <a:off x="5715554" y="643465"/>
-            <a:ext cx="5397897" cy="5397897"/>
+            <a:off x="1155700" y="550506"/>
+            <a:ext cx="3102219" cy="3102219"/>
           </a:xfrm>
           <a:prstGeom prst="roundRect">
             <a:avLst>
@@ -20829,104 +20480,9 @@
     </p:spTree>
     <p:extLst>
       <p:ext uri="{BB962C8B-B14F-4D97-AF65-F5344CB8AC3E}">
-        <p14:creationId xmlns:p14="http://schemas.microsoft.com/office/powerpoint/2010/main" val="384178258"/>
+        <p14:creationId xmlns:p14="http://schemas.microsoft.com/office/powerpoint/2010/main" val="223673903"/>
       </p:ext>
     </p:extLst>
-  </p:cSld>
-  <p:clrMapOvr>
-    <a:overrideClrMapping bg1="lt1" tx1="dk1" bg2="lt2" tx2="dk2" accent1="accent1" accent2="accent2" accent3="accent3" accent4="accent4" accent5="accent5" accent6="accent6" hlink="hlink" folHlink="folHlink"/>
-  </p:clrMapOvr>
-</p:sld>
-</file>
-
-<file path=ppt/slides/slide21.xml><?xml version="1.0" encoding="utf-8"?>
-<p:sld xmlns:a="http://schemas.openxmlformats.org/drawingml/2006/main" xmlns:r="http://schemas.openxmlformats.org/officeDocument/2006/relationships" xmlns:p="http://schemas.openxmlformats.org/presentationml/2006/main">
-  <p:cSld>
-    <p:spTree>
-      <p:nvGrpSpPr>
-        <p:cNvPr id="1" name=""/>
-        <p:cNvGrpSpPr/>
-        <p:nvPr/>
-      </p:nvGrpSpPr>
-      <p:grpSpPr>
-        <a:xfrm>
-          <a:off x="0" y="0"/>
-          <a:ext cx="0" cy="0"/>
-          <a:chOff x="0" y="0"/>
-          <a:chExt cx="0" cy="0"/>
-        </a:xfrm>
-      </p:grpSpPr>
-      <p:sp>
-        <p:nvSpPr>
-          <p:cNvPr id="2" name="Title 1">
-            <a:extLst>
-              <a:ext uri="{FF2B5EF4-FFF2-40B4-BE49-F238E27FC236}">
-                <a16:creationId xmlns:a16="http://schemas.microsoft.com/office/drawing/2014/main" id="{2AE3F67C-20FD-4751-9CA4-48AE620A5E27}"/>
-              </a:ext>
-            </a:extLst>
-          </p:cNvPr>
-          <p:cNvSpPr txBox="1">
-            <a:spLocks noGrp="1"/>
-          </p:cNvSpPr>
-          <p:nvPr>
-            <p:ph type="title"/>
-          </p:nvPr>
-        </p:nvSpPr>
-        <p:spPr/>
-        <p:txBody>
-          <a:bodyPr/>
-          <a:lstStyle/>
-          <a:p>
-            <a:pPr lvl="0"/>
-            <a:r>
-              <a:rPr lang="en-US" dirty="0"/>
-              <a:t>Sources</a:t>
-            </a:r>
-            <a:endParaRPr lang="en-DE" dirty="0"/>
-          </a:p>
-        </p:txBody>
-      </p:sp>
-      <p:sp>
-        <p:nvSpPr>
-          <p:cNvPr id="3" name="Content Placeholder 2">
-            <a:extLst>
-              <a:ext uri="{FF2B5EF4-FFF2-40B4-BE49-F238E27FC236}">
-                <a16:creationId xmlns:a16="http://schemas.microsoft.com/office/drawing/2014/main" id="{87F5DA1B-DA16-4278-8848-51572EB7756E}"/>
-              </a:ext>
-            </a:extLst>
-          </p:cNvPr>
-          <p:cNvSpPr txBox="1">
-            <a:spLocks noGrp="1"/>
-          </p:cNvSpPr>
-          <p:nvPr>
-            <p:ph idx="1"/>
-          </p:nvPr>
-        </p:nvSpPr>
-        <p:spPr/>
-        <p:txBody>
-          <a:bodyPr/>
-          <a:lstStyle/>
-          <a:p>
-            <a:pPr lvl="0"/>
-            <a:r>
-              <a:rPr lang="en-US"/>
-              <a:t>OpenCL Infografiken: </a:t>
-            </a:r>
-            <a:r>
-              <a:rPr lang="en-US">
-                <a:hlinkClick r:id="rId2"/>
-              </a:rPr>
-              <a:t>https://github.com/KhronosGroup/OpenCL-Guide</a:t>
-            </a:r>
-            <a:r>
-              <a:rPr lang="en-US"/>
-              <a:t> (CC-BY 4.0)</a:t>
-            </a:r>
-            <a:endParaRPr lang="en-DE"/>
-          </a:p>
-        </p:txBody>
-      </p:sp>
-    </p:spTree>
   </p:cSld>
   <p:clrMapOvr>
     <a:masterClrMapping/>

</xml_diff>

<commit_message>
new performance benchmarks for presentation
</commit_message>
<xml_diff>
--- a/docs/game-of-life-presi.pptx
+++ b/docs/game-of-life-presi.pptx
@@ -244,7 +244,7 @@
           <a:p>
             <a:fld id="{D3CBDB8B-0985-4198-A2F1-361C2E58674E}" type="datetimeFigureOut">
               <a:rPr lang="en-US" smtClean="0"/>
-              <a:t>1/15/2022</a:t>
+              <a:t>1/16/2022</a:t>
             </a:fld>
             <a:endParaRPr lang="en-US"/>
           </a:p>
@@ -606,7 +606,7 @@
           <a:effectLst/>
           <a:extLst>
             <a:ext uri="{91240B29-F687-4f45-9708-019B960494DF}">
-              <a14:hiddenLine xmlns:a14="http://schemas.microsoft.com/office/drawing/2010/main" xmlns="" w="9525">
+              <a14:hiddenLine xmlns="" xmlns:a14="http://schemas.microsoft.com/office/drawing/2010/main" w="9525">
                 <a:solidFill>
                   <a:srgbClr val="000000"/>
                 </a:solidFill>
@@ -798,7 +798,7 @@
           <a:p>
             <a:fld id="{06D29011-0A68-48D8-B3E4-D57F1565AF09}" type="datetimeFigureOut">
               <a:rPr lang="en-US" smtClean="0"/>
-              <a:t>1/15/2022</a:t>
+              <a:t>1/16/2022</a:t>
             </a:fld>
             <a:endParaRPr lang="en-US"/>
           </a:p>
@@ -1116,7 +1116,7 @@
           <a:p>
             <a:fld id="{06D29011-0A68-48D8-B3E4-D57F1565AF09}" type="datetimeFigureOut">
               <a:rPr lang="en-US" smtClean="0"/>
-              <a:t>1/15/2022</a:t>
+              <a:t>1/16/2022</a:t>
             </a:fld>
             <a:endParaRPr lang="en-US"/>
           </a:p>
@@ -1604,7 +1604,7 @@
           <a:p>
             <a:fld id="{06D29011-0A68-48D8-B3E4-D57F1565AF09}" type="datetimeFigureOut">
               <a:rPr lang="en-US" smtClean="0"/>
-              <a:t>1/15/2022</a:t>
+              <a:t>1/16/2022</a:t>
             </a:fld>
             <a:endParaRPr lang="en-US"/>
           </a:p>
@@ -1973,7 +1973,7 @@
           <a:p>
             <a:fld id="{06D29011-0A68-48D8-B3E4-D57F1565AF09}" type="datetimeFigureOut">
               <a:rPr lang="en-US" smtClean="0"/>
-              <a:t>1/15/2022</a:t>
+              <a:t>1/16/2022</a:t>
             </a:fld>
             <a:endParaRPr lang="en-US"/>
           </a:p>
@@ -2128,7 +2128,7 @@
           <a:ln/>
           <a:extLst>
             <a:ext uri="{91240B29-F687-4f45-9708-019B960494DF}">
-              <a14:hiddenLine xmlns:a14="http://schemas.microsoft.com/office/drawing/2010/main" xmlns="" w="9525">
+              <a14:hiddenLine xmlns="" xmlns:a14="http://schemas.microsoft.com/office/drawing/2010/main" w="9525">
                 <a:solidFill>
                   <a:srgbClr val="000000"/>
                 </a:solidFill>
@@ -2246,7 +2246,7 @@
           <a:p>
             <a:fld id="{06D29011-0A68-48D8-B3E4-D57F1565AF09}" type="datetimeFigureOut">
               <a:rPr lang="en-US" smtClean="0"/>
-              <a:t>1/15/2022</a:t>
+              <a:t>1/16/2022</a:t>
             </a:fld>
             <a:endParaRPr lang="en-US"/>
           </a:p>
@@ -2403,7 +2403,7 @@
           <a:ln/>
           <a:extLst>
             <a:ext uri="{91240B29-F687-4f45-9708-019B960494DF}">
-              <a14:hiddenLine xmlns:a14="http://schemas.microsoft.com/office/drawing/2010/main" xmlns="" w="9525">
+              <a14:hiddenLine xmlns="" xmlns:a14="http://schemas.microsoft.com/office/drawing/2010/main" w="9525">
                 <a:solidFill>
                   <a:srgbClr val="000000"/>
                 </a:solidFill>
@@ -2531,7 +2531,7 @@
           <a:p>
             <a:fld id="{06D29011-0A68-48D8-B3E4-D57F1565AF09}" type="datetimeFigureOut">
               <a:rPr lang="en-US" smtClean="0"/>
-              <a:t>1/15/2022</a:t>
+              <a:t>1/16/2022</a:t>
             </a:fld>
             <a:endParaRPr lang="en-US"/>
           </a:p>
@@ -2686,7 +2686,7 @@
           <a:ln/>
           <a:extLst>
             <a:ext uri="{91240B29-F687-4f45-9708-019B960494DF}">
-              <a14:hiddenLine xmlns:a14="http://schemas.microsoft.com/office/drawing/2010/main" xmlns="" w="9525">
+              <a14:hiddenLine xmlns="" xmlns:a14="http://schemas.microsoft.com/office/drawing/2010/main" w="9525">
                 <a:solidFill>
                   <a:srgbClr val="000000"/>
                 </a:solidFill>
@@ -2814,7 +2814,7 @@
           <a:p>
             <a:fld id="{06D29011-0A68-48D8-B3E4-D57F1565AF09}" type="datetimeFigureOut">
               <a:rPr lang="en-US" smtClean="0"/>
-              <a:t>1/15/2022</a:t>
+              <a:t>1/16/2022</a:t>
             </a:fld>
             <a:endParaRPr lang="en-US"/>
           </a:p>
@@ -3157,7 +3157,7 @@
           <a:p>
             <a:fld id="{06D29011-0A68-48D8-B3E4-D57F1565AF09}" type="datetimeFigureOut">
               <a:rPr lang="en-US" smtClean="0"/>
-              <a:t>1/15/2022</a:t>
+              <a:t>1/16/2022</a:t>
             </a:fld>
             <a:endParaRPr lang="en-US"/>
           </a:p>
@@ -3312,7 +3312,7 @@
           <a:ln/>
           <a:extLst>
             <a:ext uri="{91240B29-F687-4f45-9708-019B960494DF}">
-              <a14:hiddenLine xmlns:a14="http://schemas.microsoft.com/office/drawing/2010/main" xmlns="" w="9525">
+              <a14:hiddenLine xmlns="" xmlns:a14="http://schemas.microsoft.com/office/drawing/2010/main" w="9525">
                 <a:solidFill>
                   <a:srgbClr val="000000"/>
                 </a:solidFill>
@@ -3496,7 +3496,7 @@
           <a:p>
             <a:fld id="{06D29011-0A68-48D8-B3E4-D57F1565AF09}" type="datetimeFigureOut">
               <a:rPr lang="en-US" smtClean="0"/>
-              <a:t>1/15/2022</a:t>
+              <a:t>1/16/2022</a:t>
             </a:fld>
             <a:endParaRPr lang="en-US"/>
           </a:p>
@@ -3651,7 +3651,7 @@
           <a:ln/>
           <a:extLst>
             <a:ext uri="{91240B29-F687-4f45-9708-019B960494DF}">
-              <a14:hiddenLine xmlns:a14="http://schemas.microsoft.com/office/drawing/2010/main" xmlns="" w="9525">
+              <a14:hiddenLine xmlns="" xmlns:a14="http://schemas.microsoft.com/office/drawing/2010/main" w="9525">
                 <a:solidFill>
                   <a:srgbClr val="000000"/>
                 </a:solidFill>
@@ -3973,7 +3973,7 @@
           <a:p>
             <a:fld id="{06D29011-0A68-48D8-B3E4-D57F1565AF09}" type="datetimeFigureOut">
               <a:rPr lang="en-US" smtClean="0"/>
-              <a:t>1/15/2022</a:t>
+              <a:t>1/16/2022</a:t>
             </a:fld>
             <a:endParaRPr lang="en-US"/>
           </a:p>
@@ -4128,7 +4128,7 @@
           <a:ln/>
           <a:extLst>
             <a:ext uri="{91240B29-F687-4f45-9708-019B960494DF}">
-              <a14:hiddenLine xmlns:a14="http://schemas.microsoft.com/office/drawing/2010/main" xmlns="" w="9525">
+              <a14:hiddenLine xmlns="" xmlns:a14="http://schemas.microsoft.com/office/drawing/2010/main" w="9525">
                 <a:solidFill>
                   <a:srgbClr val="000000"/>
                 </a:solidFill>
@@ -4194,7 +4194,7 @@
           <a:p>
             <a:fld id="{06D29011-0A68-48D8-B3E4-D57F1565AF09}" type="datetimeFigureOut">
               <a:rPr lang="en-US" smtClean="0"/>
-              <a:t>1/15/2022</a:t>
+              <a:t>1/16/2022</a:t>
             </a:fld>
             <a:endParaRPr lang="en-US"/>
           </a:p>
@@ -4289,7 +4289,7 @@
           <a:p>
             <a:fld id="{06D29011-0A68-48D8-B3E4-D57F1565AF09}" type="datetimeFigureOut">
               <a:rPr lang="en-US" smtClean="0"/>
-              <a:t>1/15/2022</a:t>
+              <a:t>1/16/2022</a:t>
             </a:fld>
             <a:endParaRPr lang="en-US"/>
           </a:p>
@@ -4557,7 +4557,7 @@
           <a:ln/>
           <a:extLst>
             <a:ext uri="{91240B29-F687-4f45-9708-019B960494DF}">
-              <a14:hiddenLine xmlns:a14="http://schemas.microsoft.com/office/drawing/2010/main" xmlns="" w="9525">
+              <a14:hiddenLine xmlns="" xmlns:a14="http://schemas.microsoft.com/office/drawing/2010/main" w="9525">
                 <a:solidFill>
                   <a:srgbClr val="000000"/>
                 </a:solidFill>
@@ -4756,7 +4756,7 @@
           <a:p>
             <a:fld id="{06D29011-0A68-48D8-B3E4-D57F1565AF09}" type="datetimeFigureOut">
               <a:rPr lang="en-US" smtClean="0"/>
-              <a:t>1/15/2022</a:t>
+              <a:t>1/16/2022</a:t>
             </a:fld>
             <a:endParaRPr lang="en-US"/>
           </a:p>
@@ -5069,7 +5069,7 @@
           <a:p>
             <a:fld id="{06D29011-0A68-48D8-B3E4-D57F1565AF09}" type="datetimeFigureOut">
               <a:rPr lang="en-US" smtClean="0"/>
-              <a:t>1/15/2022</a:t>
+              <a:t>1/16/2022</a:t>
             </a:fld>
             <a:endParaRPr lang="en-US"/>
           </a:p>
@@ -5339,7 +5339,7 @@
           <a:p>
             <a:fld id="{06D29011-0A68-48D8-B3E4-D57F1565AF09}" type="datetimeFigureOut">
               <a:rPr lang="en-US" smtClean="0"/>
-              <a:t>1/15/2022</a:t>
+              <a:t>1/16/2022</a:t>
             </a:fld>
             <a:endParaRPr lang="en-US"/>
           </a:p>
@@ -6093,7 +6093,7 @@
           <a:effectLst/>
           <a:extLst>
             <a:ext uri="{91240B29-F687-4f45-9708-019B960494DF}">
-              <a14:hiddenLine xmlns="" xmlns:a14="http://schemas.microsoft.com/office/drawing/2010/main" xmlns:p14="http://schemas.microsoft.com/office/powerpoint/2010/main" xmlns:a16="http://schemas.microsoft.com/office/drawing/2014/main" w="9525">
+              <a14:hiddenLine xmlns:a16="http://schemas.microsoft.com/office/drawing/2014/main" xmlns:p14="http://schemas.microsoft.com/office/powerpoint/2010/main" xmlns:a14="http://schemas.microsoft.com/office/drawing/2010/main" xmlns="" w="9525">
                 <a:solidFill>
                   <a:srgbClr val="000000"/>
                 </a:solidFill>
@@ -9006,10 +9006,10 @@
       </p:sp>
       <p:pic>
         <p:nvPicPr>
-          <p:cNvPr id="5" name="Content Placeholder 4">
+          <p:cNvPr id="4" name="Picture 3">
             <a:extLst>
               <a:ext uri="{FF2B5EF4-FFF2-40B4-BE49-F238E27FC236}">
-                <a16:creationId xmlns:a16="http://schemas.microsoft.com/office/drawing/2014/main" id="{F6B964C1-0B05-4B16-86AB-93C51D047780}"/>
+                <a16:creationId xmlns:a16="http://schemas.microsoft.com/office/drawing/2014/main" id="{7E17C0E6-001E-4737-8ABF-30A386A14A48}"/>
               </a:ext>
             </a:extLst>
           </p:cNvPr>
@@ -9026,20 +9026,12 @@
         </p:blipFill>
         <p:spPr>
           <a:xfrm>
-            <a:off x="2296925" y="2484071"/>
-            <a:ext cx="7805464" cy="3844191"/>
+            <a:off x="2614154" y="2495315"/>
+            <a:ext cx="7141150" cy="3648309"/>
           </a:xfrm>
-          <a:prstGeom prst="roundRect">
-            <a:avLst>
-              <a:gd name="adj" fmla="val 3546"/>
-            </a:avLst>
+          <a:prstGeom prst="rect">
+            <a:avLst/>
           </a:prstGeom>
-          <a:ln>
-            <a:solidFill>
-              <a:schemeClr val="accent1"/>
-            </a:solidFill>
-          </a:ln>
-          <a:effectLst/>
         </p:spPr>
       </p:pic>
     </p:spTree>
@@ -19890,7 +19882,7 @@
           <a:effectLst/>
           <a:extLst>
             <a:ext uri="{91240B29-F687-4f45-9708-019B960494DF}">
-              <a14:hiddenLine xmlns="" xmlns:a14="http://schemas.microsoft.com/office/drawing/2010/main" xmlns:p14="http://schemas.microsoft.com/office/powerpoint/2010/main" xmlns:a16="http://schemas.microsoft.com/office/drawing/2014/main" w="9525">
+              <a14:hiddenLine xmlns:a16="http://schemas.microsoft.com/office/drawing/2014/main" xmlns:p14="http://schemas.microsoft.com/office/powerpoint/2010/main" xmlns:a14="http://schemas.microsoft.com/office/drawing/2010/main" xmlns="" w="9525">
                 <a:solidFill>
                   <a:srgbClr val="000000"/>
                 </a:solidFill>
@@ -28658,44 +28650,6 @@
       </p:sp>
       <p:pic>
         <p:nvPicPr>
-          <p:cNvPr id="5" name="Content Placeholder 4">
-            <a:extLst>
-              <a:ext uri="{FF2B5EF4-FFF2-40B4-BE49-F238E27FC236}">
-                <a16:creationId xmlns:a16="http://schemas.microsoft.com/office/drawing/2014/main" id="{A245CD43-1D9E-43A6-91AE-FC6436FEF8C9}"/>
-              </a:ext>
-            </a:extLst>
-          </p:cNvPr>
-          <p:cNvPicPr>
-            <a:picLocks noChangeAspect="1"/>
-          </p:cNvPicPr>
-          <p:nvPr/>
-        </p:nvPicPr>
-        <p:blipFill>
-          <a:blip r:embed="rId2"/>
-          <a:stretch>
-            <a:fillRect/>
-          </a:stretch>
-        </p:blipFill>
-        <p:spPr>
-          <a:xfrm>
-            <a:off x="5168484" y="4032667"/>
-            <a:ext cx="6227007" cy="1899237"/>
-          </a:xfrm>
-          <a:prstGeom prst="roundRect">
-            <a:avLst>
-              <a:gd name="adj" fmla="val 3876"/>
-            </a:avLst>
-          </a:prstGeom>
-          <a:ln>
-            <a:solidFill>
-              <a:schemeClr val="accent1"/>
-            </a:solidFill>
-          </a:ln>
-          <a:effectLst/>
-        </p:spPr>
-      </p:pic>
-      <p:pic>
-        <p:nvPicPr>
           <p:cNvPr id="10" name="Content Placeholder 4" descr="A picture containing timeline&#10;&#10;Description automatically generated">
             <a:extLst>
               <a:ext uri="{FF2B5EF4-FFF2-40B4-BE49-F238E27FC236}">
@@ -28711,7 +28665,7 @@
           </p:nvPr>
         </p:nvPicPr>
         <p:blipFill>
-          <a:blip r:embed="rId3">
+          <a:blip r:embed="rId2">
             <a:extLst>
               <a:ext uri="{28A0092B-C50C-407E-A947-70E740481C1C}">
                 <a14:useLocalDpi xmlns:a14="http://schemas.microsoft.com/office/drawing/2010/main" val="0"/>
@@ -29008,6 +28962,36 @@
           </a:p>
         </p:txBody>
       </p:sp>
+      <p:pic>
+        <p:nvPicPr>
+          <p:cNvPr id="4" name="Picture 3">
+            <a:extLst>
+              <a:ext uri="{FF2B5EF4-FFF2-40B4-BE49-F238E27FC236}">
+                <a16:creationId xmlns:a16="http://schemas.microsoft.com/office/drawing/2014/main" id="{DD9C46E1-8FFB-48ED-8601-2C372AEB42C7}"/>
+              </a:ext>
+            </a:extLst>
+          </p:cNvPr>
+          <p:cNvPicPr>
+            <a:picLocks noChangeAspect="1"/>
+          </p:cNvPicPr>
+          <p:nvPr/>
+        </p:nvPicPr>
+        <p:blipFill>
+          <a:blip r:embed="rId3"/>
+          <a:stretch>
+            <a:fillRect/>
+          </a:stretch>
+        </p:blipFill>
+        <p:spPr>
+          <a:xfrm>
+            <a:off x="4812171" y="3763957"/>
+            <a:ext cx="6939634" cy="2567184"/>
+          </a:xfrm>
+          <a:prstGeom prst="rect">
+            <a:avLst/>
+          </a:prstGeom>
+        </p:spPr>
+      </p:pic>
     </p:spTree>
     <p:extLst>
       <p:ext uri="{BB962C8B-B14F-4D97-AF65-F5344CB8AC3E}">

</xml_diff>

<commit_message>
Added some text to präse
</commit_message>
<xml_diff>
--- a/docs/game-of-life-presi.pptx
+++ b/docs/game-of-life-presi.pptx
@@ -17014,6 +17014,54 @@
           </a:prstGeom>
         </p:spPr>
       </p:pic>
+      <p:sp>
+        <p:nvSpPr>
+          <p:cNvPr id="3" name="TextBox 2">
+            <a:extLst>
+              <a:ext uri="{FF2B5EF4-FFF2-40B4-BE49-F238E27FC236}">
+                <a16:creationId xmlns:a16="http://schemas.microsoft.com/office/drawing/2014/main" id="{28D80D26-F1A0-4402-B3D0-69F001AB7151}"/>
+              </a:ext>
+            </a:extLst>
+          </p:cNvPr>
+          <p:cNvSpPr txBox="1"/>
+          <p:nvPr/>
+        </p:nvSpPr>
+        <p:spPr>
+          <a:xfrm>
+            <a:off x="4007627" y="2642911"/>
+            <a:ext cx="4176744" cy="646331"/>
+          </a:xfrm>
+          <a:prstGeom prst="rect">
+            <a:avLst/>
+          </a:prstGeom>
+          <a:noFill/>
+        </p:spPr>
+        <p:txBody>
+          <a:bodyPr wrap="square" rtlCol="0">
+            <a:spAutoFit/>
+          </a:bodyPr>
+          <a:lstStyle/>
+          <a:p>
+            <a:r>
+              <a:rPr lang="en-US" dirty="0"/>
+              <a:t>AMD R5 3600, DDR4-3200, GTX 1070, </a:t>
+            </a:r>
+            <a:r>
+              <a:rPr lang="en-US" dirty="0" err="1"/>
+              <a:t>Zeiten</a:t>
+            </a:r>
+            <a:r>
+              <a:rPr lang="en-US" dirty="0"/>
+              <a:t> in </a:t>
+            </a:r>
+            <a:r>
+              <a:rPr lang="en-US" dirty="0" err="1"/>
+              <a:t>ms</a:t>
+            </a:r>
+            <a:endParaRPr lang="en-DE" dirty="0"/>
+          </a:p>
+        </p:txBody>
+      </p:sp>
     </p:spTree>
   </p:cSld>
   <p:clrMapOvr>

</xml_diff>